<commit_message>
[ve401] rc4, s4, mid
</commit_message>
<xml_diff>
--- a/tex/rc/figures.pptx
+++ b/tex/rc/figures.pptx
@@ -10,6 +10,8 @@
     <p:sldId id="258" r:id="rId5"/>
     <p:sldId id="259" r:id="rId6"/>
     <p:sldId id="260" r:id="rId7"/>
+    <p:sldId id="261" r:id="rId8"/>
+    <p:sldId id="262" r:id="rId9"/>
   </p:sldIdLst>
   <p:sldSz cx="12192000" cy="6858000"/>
   <p:notesSz cx="7772400" cy="10058400"/>
@@ -6262,14 +6264,14 @@
           <a:p>
             <a:pPr algn="ctr"/>
             <a:r>
-              <a:rPr lang="" altLang="en-US">
+              <a:rPr lang="en-US" altLang="en-US">
                 <a:solidFill>
                   <a:schemeClr val="tx1"/>
                 </a:solidFill>
               </a:rPr>
               <a:t>a1</a:t>
             </a:r>
-            <a:endParaRPr lang="" altLang="en-US">
+            <a:endParaRPr lang="en-US" altLang="en-US">
               <a:solidFill>
                 <a:schemeClr val="tx1"/>
               </a:solidFill>
@@ -6357,17 +6359,9 @@
                   <a:schemeClr val="tx1"/>
                 </a:solidFill>
               </a:rPr>
-              <a:t>a</a:t>
-            </a:r>
-            <a:r>
-              <a:rPr lang="" altLang="en-US">
-                <a:solidFill>
-                  <a:schemeClr val="tx1"/>
-                </a:solidFill>
-              </a:rPr>
-              <a:t>3</a:t>
-            </a:r>
-            <a:endParaRPr lang="" altLang="en-US">
+              <a:t>a3</a:t>
+            </a:r>
+            <a:endParaRPr lang="en-US" altLang="en-US">
               <a:solidFill>
                 <a:schemeClr val="tx1"/>
               </a:solidFill>
@@ -6650,17 +6644,372 @@
           <a:p>
             <a:pPr algn="ctr"/>
             <a:r>
-              <a:rPr lang="" altLang="en-US">
+              <a:rPr lang="en-US" altLang="en-US">
                 <a:solidFill>
                   <a:schemeClr val="tx1"/>
                 </a:solidFill>
               </a:rPr>
               <a:t>f1</a:t>
             </a:r>
-            <a:endParaRPr lang="" altLang="en-US">
+            <a:endParaRPr lang="en-US" altLang="en-US">
               <a:solidFill>
                 <a:schemeClr val="tx1"/>
               </a:solidFill>
+            </a:endParaRPr>
+          </a:p>
+        </p:txBody>
+      </p:sp>
+    </p:spTree>
+  </p:cSld>
+  <p:clrMapOvr>
+    <a:masterClrMapping/>
+  </p:clrMapOvr>
+</p:sld>
+</file>
+
+<file path=ppt/slides/slide6.xml><?xml version="1.0" encoding="utf-8"?>
+<p:sld xmlns:a="http://schemas.openxmlformats.org/drawingml/2006/main" xmlns:r="http://schemas.openxmlformats.org/officeDocument/2006/relationships" xmlns:p="http://schemas.openxmlformats.org/presentationml/2006/main">
+  <p:cSld>
+    <p:spTree>
+      <p:nvGrpSpPr>
+        <p:cNvPr id="1" name=""/>
+        <p:cNvGrpSpPr/>
+        <p:nvPr/>
+      </p:nvGrpSpPr>
+      <p:grpSpPr/>
+      <p:pic>
+        <p:nvPicPr>
+          <p:cNvPr id="4" name="Picture 3" descr="s4fig1"/>
+          <p:cNvPicPr>
+            <a:picLocks noChangeAspect="1"/>
+          </p:cNvPicPr>
+          <p:nvPr/>
+        </p:nvPicPr>
+        <p:blipFill>
+          <a:blip r:embed="rId1"/>
+          <a:stretch>
+            <a:fillRect/>
+          </a:stretch>
+        </p:blipFill>
+        <p:spPr>
+          <a:xfrm>
+            <a:off x="1066800" y="313055"/>
+            <a:ext cx="10058400" cy="6231890"/>
+          </a:xfrm>
+          <a:prstGeom prst="rect">
+            <a:avLst/>
+          </a:prstGeom>
+        </p:spPr>
+      </p:pic>
+      <p:cxnSp>
+        <p:nvCxnSpPr>
+          <p:cNvPr id="6" name="Straight Connector 5"/>
+          <p:cNvCxnSpPr/>
+          <p:nvPr/>
+        </p:nvCxnSpPr>
+        <p:spPr>
+          <a:xfrm flipH="1">
+            <a:off x="4267200" y="2493010"/>
+            <a:ext cx="28575" cy="3672205"/>
+          </a:xfrm>
+          <a:prstGeom prst="line">
+            <a:avLst/>
+          </a:prstGeom>
+          <a:ln w="28575">
+            <a:solidFill>
+              <a:srgbClr val="C00000"/>
+            </a:solidFill>
+            <a:prstDash val="lgDash"/>
+          </a:ln>
+        </p:spPr>
+        <p:style>
+          <a:lnRef idx="1">
+            <a:schemeClr val="accent1"/>
+          </a:lnRef>
+          <a:fillRef idx="0">
+            <a:schemeClr val="accent1"/>
+          </a:fillRef>
+          <a:effectRef idx="0">
+            <a:schemeClr val="accent1"/>
+          </a:effectRef>
+          <a:fontRef idx="minor">
+            <a:schemeClr val="tx1"/>
+          </a:fontRef>
+        </p:style>
+      </p:cxnSp>
+      <p:cxnSp>
+        <p:nvCxnSpPr>
+          <p:cNvPr id="13" name="Straight Connector 12"/>
+          <p:cNvCxnSpPr/>
+          <p:nvPr/>
+        </p:nvCxnSpPr>
+        <p:spPr>
+          <a:xfrm flipH="1">
+            <a:off x="5494020" y="1412875"/>
+            <a:ext cx="26035" cy="4752340"/>
+          </a:xfrm>
+          <a:prstGeom prst="line">
+            <a:avLst/>
+          </a:prstGeom>
+          <a:ln w="28575">
+            <a:solidFill>
+              <a:srgbClr val="C00000"/>
+            </a:solidFill>
+            <a:prstDash val="lgDash"/>
+          </a:ln>
+        </p:spPr>
+        <p:style>
+          <a:lnRef idx="1">
+            <a:schemeClr val="accent1"/>
+          </a:lnRef>
+          <a:fillRef idx="0">
+            <a:schemeClr val="accent1"/>
+          </a:fillRef>
+          <a:effectRef idx="0">
+            <a:schemeClr val="accent1"/>
+          </a:effectRef>
+          <a:fontRef idx="minor">
+            <a:schemeClr val="tx1"/>
+          </a:fontRef>
+        </p:style>
+      </p:cxnSp>
+      <p:sp>
+        <p:nvSpPr>
+          <p:cNvPr id="14" name="Text Box 13"/>
+          <p:cNvSpPr txBox="1"/>
+          <p:nvPr/>
+        </p:nvSpPr>
+        <p:spPr>
+          <a:xfrm>
+            <a:off x="4018280" y="6394450"/>
+            <a:ext cx="526415" cy="368300"/>
+          </a:xfrm>
+          <a:prstGeom prst="rect">
+            <a:avLst/>
+          </a:prstGeom>
+          <a:noFill/>
+        </p:spPr>
+        <p:txBody>
+          <a:bodyPr wrap="square" rtlCol="0">
+            <a:spAutoFit/>
+          </a:bodyPr>
+          <a:p>
+            <a:pPr algn="ctr"/>
+            <a:r>
+              <a:rPr lang="en-US" altLang="en-US" b="1" i="1">
+                <a:solidFill>
+                  <a:srgbClr val="C00000"/>
+                </a:solidFill>
+              </a:rPr>
+              <a:t>x</a:t>
+            </a:r>
+            <a:r>
+              <a:rPr lang="en-US" altLang="en-US" b="1" i="1" baseline="-25000">
+                <a:solidFill>
+                  <a:srgbClr val="C00000"/>
+                </a:solidFill>
+              </a:rPr>
+              <a:t>1</a:t>
+            </a:r>
+            <a:endParaRPr lang="en-US" altLang="en-US" b="1" i="1" baseline="-25000">
+              <a:solidFill>
+                <a:srgbClr val="C00000"/>
+              </a:solidFill>
+            </a:endParaRPr>
+          </a:p>
+        </p:txBody>
+      </p:sp>
+      <p:sp>
+        <p:nvSpPr>
+          <p:cNvPr id="15" name="Text Box 14"/>
+          <p:cNvSpPr txBox="1"/>
+          <p:nvPr/>
+        </p:nvSpPr>
+        <p:spPr>
+          <a:xfrm>
+            <a:off x="5243830" y="6394450"/>
+            <a:ext cx="526415" cy="368300"/>
+          </a:xfrm>
+          <a:prstGeom prst="rect">
+            <a:avLst/>
+          </a:prstGeom>
+          <a:noFill/>
+        </p:spPr>
+        <p:txBody>
+          <a:bodyPr wrap="square" rtlCol="0">
+            <a:spAutoFit/>
+          </a:bodyPr>
+          <a:p>
+            <a:pPr algn="ctr"/>
+            <a:r>
+              <a:rPr lang="en-US" altLang="en-US" b="1" i="1">
+                <a:solidFill>
+                  <a:srgbClr val="C00000"/>
+                </a:solidFill>
+              </a:rPr>
+              <a:t>x</a:t>
+            </a:r>
+            <a:r>
+              <a:rPr lang="en-US" altLang="en-US" b="1" i="1" baseline="-25000">
+                <a:solidFill>
+                  <a:srgbClr val="C00000"/>
+                </a:solidFill>
+              </a:rPr>
+              <a:t>2</a:t>
+            </a:r>
+            <a:endParaRPr lang="en-US" altLang="en-US" b="1" i="1" baseline="-25000">
+              <a:solidFill>
+                <a:srgbClr val="C00000"/>
+              </a:solidFill>
+            </a:endParaRPr>
+          </a:p>
+        </p:txBody>
+      </p:sp>
+    </p:spTree>
+  </p:cSld>
+  <p:clrMapOvr>
+    <a:masterClrMapping/>
+  </p:clrMapOvr>
+</p:sld>
+</file>
+
+<file path=ppt/slides/slide7.xml><?xml version="1.0" encoding="utf-8"?>
+<p:sld xmlns:a="http://schemas.openxmlformats.org/drawingml/2006/main" xmlns:r="http://schemas.openxmlformats.org/officeDocument/2006/relationships" xmlns:p="http://schemas.openxmlformats.org/presentationml/2006/main">
+  <p:cSld>
+    <p:spTree>
+      <p:nvGrpSpPr>
+        <p:cNvPr id="1" name=""/>
+        <p:cNvGrpSpPr/>
+        <p:nvPr/>
+      </p:nvGrpSpPr>
+      <p:grpSpPr/>
+      <p:pic>
+        <p:nvPicPr>
+          <p:cNvPr id="3" name="Picture 2" descr="rc4fig12"/>
+          <p:cNvPicPr>
+            <a:picLocks noChangeAspect="1"/>
+          </p:cNvPicPr>
+          <p:nvPr/>
+        </p:nvPicPr>
+        <p:blipFill>
+          <a:blip r:embed="rId1"/>
+          <a:stretch>
+            <a:fillRect/>
+          </a:stretch>
+        </p:blipFill>
+        <p:spPr>
+          <a:xfrm>
+            <a:off x="1066800" y="227965"/>
+            <a:ext cx="10058400" cy="6401435"/>
+          </a:xfrm>
+          <a:prstGeom prst="rect">
+            <a:avLst/>
+          </a:prstGeom>
+        </p:spPr>
+      </p:pic>
+      <p:sp>
+        <p:nvSpPr>
+          <p:cNvPr id="5" name="Text Box 4"/>
+          <p:cNvSpPr txBox="1"/>
+          <p:nvPr/>
+        </p:nvSpPr>
+        <p:spPr>
+          <a:xfrm>
+            <a:off x="6153150" y="6287135"/>
+            <a:ext cx="699770" cy="460375"/>
+          </a:xfrm>
+          <a:prstGeom prst="rect">
+            <a:avLst/>
+          </a:prstGeom>
+          <a:noFill/>
+        </p:spPr>
+        <p:txBody>
+          <a:bodyPr wrap="square" rtlCol="0">
+            <a:spAutoFit/>
+          </a:bodyPr>
+          <a:p>
+            <a:pPr algn="ctr"/>
+            <a:r>
+              <a:rPr lang="en-US" sz="2400">
+                <a:latin typeface="+mn-ea"/>
+                <a:cs typeface="+mn-ea"/>
+              </a:rPr>
+              <a:t>ᵪ</a:t>
+            </a:r>
+            <a:r>
+              <a:rPr lang="en-US" sz="2400" baseline="-25000">
+                <a:latin typeface="Arial" panose="02080604020202020204" pitchFamily="34" charset="0"/>
+                <a:cs typeface="Arial" panose="02080604020202020204" pitchFamily="34" charset="0"/>
+              </a:rPr>
+              <a:t>α</a:t>
+            </a:r>
+            <a:r>
+              <a:rPr lang="" altLang="en-US" sz="2400" baseline="-25000">
+                <a:latin typeface="Arial" panose="02080604020202020204" pitchFamily="34" charset="0"/>
+                <a:cs typeface="Arial" panose="02080604020202020204" pitchFamily="34" charset="0"/>
+              </a:rPr>
+              <a:t>/2</a:t>
+            </a:r>
+            <a:endParaRPr lang="" altLang="en-US" sz="2400" baseline="-25000">
+              <a:latin typeface="Arial" panose="02080604020202020204" pitchFamily="34" charset="0"/>
+              <a:cs typeface="Arial" panose="02080604020202020204" pitchFamily="34" charset="0"/>
+            </a:endParaRPr>
+          </a:p>
+        </p:txBody>
+      </p:sp>
+      <p:sp>
+        <p:nvSpPr>
+          <p:cNvPr id="7" name="Text Box 6"/>
+          <p:cNvSpPr txBox="1"/>
+          <p:nvPr/>
+        </p:nvSpPr>
+        <p:spPr>
+          <a:xfrm>
+            <a:off x="1423670" y="6287135"/>
+            <a:ext cx="1101090" cy="460375"/>
+          </a:xfrm>
+          <a:prstGeom prst="rect">
+            <a:avLst/>
+          </a:prstGeom>
+          <a:noFill/>
+        </p:spPr>
+        <p:txBody>
+          <a:bodyPr wrap="square" rtlCol="0">
+            <a:spAutoFit/>
+          </a:bodyPr>
+          <a:p>
+            <a:pPr algn="ctr"/>
+            <a:r>
+              <a:rPr lang="en-US" sz="2400">
+                <a:latin typeface="+mn-ea"/>
+                <a:cs typeface="+mn-ea"/>
+              </a:rPr>
+              <a:t>ᵪ</a:t>
+            </a:r>
+            <a:r>
+              <a:rPr lang="" altLang="en-US" sz="2400" baseline="-25000">
+                <a:latin typeface="+mn-ea"/>
+                <a:cs typeface="+mn-ea"/>
+              </a:rPr>
+              <a:t>1-</a:t>
+            </a:r>
+            <a:r>
+              <a:rPr lang="en-US" sz="2400" baseline="-25000">
+                <a:latin typeface="Arial" panose="02080604020202020204" pitchFamily="34" charset="0"/>
+                <a:cs typeface="Arial" panose="02080604020202020204" pitchFamily="34" charset="0"/>
+              </a:rPr>
+              <a:t>α</a:t>
+            </a:r>
+            <a:r>
+              <a:rPr lang="en-US" altLang="en-US" sz="2400" baseline="-25000">
+                <a:latin typeface="Arial" panose="02080604020202020204" pitchFamily="34" charset="0"/>
+                <a:cs typeface="Arial" panose="02080604020202020204" pitchFamily="34" charset="0"/>
+              </a:rPr>
+              <a:t>/2</a:t>
+            </a:r>
+            <a:endParaRPr lang="en-US" altLang="en-US" sz="2400" baseline="-25000">
+              <a:latin typeface="Arial" panose="02080604020202020204" pitchFamily="34" charset="0"/>
+              <a:cs typeface="Arial" panose="02080604020202020204" pitchFamily="34" charset="0"/>
             </a:endParaRPr>
           </a:p>
         </p:txBody>

</xml_diff>